<commit_message>
pertemuan 5 dan 6
</commit_message>
<xml_diff>
--- a/Materi/Pertemuan - 5-Array.pptx
+++ b/Materi/Pertemuan - 5-Array.pptx
@@ -11488,7 +11488,7 @@
         </p:blipFill>
         <p:spPr bwMode="auto">
           <a:xfrm>
-            <a:off x="513238" y="1462034"/>
+            <a:off x="386862" y="2980172"/>
             <a:ext cx="3991624" cy="1668028"/>
           </a:xfrm>
           <a:prstGeom prst="rect">
@@ -11535,7 +11535,7 @@
         </p:blipFill>
         <p:spPr bwMode="auto">
           <a:xfrm>
-            <a:off x="4793268" y="1462034"/>
+            <a:off x="4734030" y="2980172"/>
             <a:ext cx="3963870" cy="1713548"/>
           </a:xfrm>
           <a:prstGeom prst="rect">
@@ -11553,6 +11553,170 @@
           </a:extLst>
         </p:spPr>
       </p:pic>
+      <p:pic>
+        <p:nvPicPr>
+          <p:cNvPr id="3" name="Picture 2" descr="Contoh Array">
+            <a:extLst>
+              <a:ext uri="{FF2B5EF4-FFF2-40B4-BE49-F238E27FC236}">
+                <a16:creationId xmlns:a16="http://schemas.microsoft.com/office/drawing/2014/main" id="{469CC642-566F-AD54-90EC-28FC87978E18}"/>
+              </a:ext>
+            </a:extLst>
+          </p:cNvPr>
+          <p:cNvPicPr>
+            <a:picLocks noChangeAspect="1" noChangeArrowheads="1"/>
+          </p:cNvPicPr>
+          <p:nvPr/>
+        </p:nvPicPr>
+        <p:blipFill>
+          <a:blip r:embed="rId6">
+            <a:extLst>
+              <a:ext uri="{28A0092B-C50C-407E-A947-70E740481C1C}">
+                <a14:useLocalDpi xmlns:a14="http://schemas.microsoft.com/office/drawing/2010/main" val="0"/>
+              </a:ext>
+            </a:extLst>
+          </a:blip>
+          <a:srcRect/>
+          <a:stretch>
+            <a:fillRect/>
+          </a:stretch>
+        </p:blipFill>
+        <p:spPr bwMode="auto">
+          <a:xfrm>
+            <a:off x="2674214" y="819561"/>
+            <a:ext cx="3560105" cy="1437616"/>
+          </a:xfrm>
+          <a:prstGeom prst="rect">
+            <a:avLst/>
+          </a:prstGeom>
+          <a:noFill/>
+          <a:extLst>
+            <a:ext uri="{909E8E84-426E-40DD-AFC4-6F175D3DCCD1}">
+              <a14:hiddenFill xmlns:a14="http://schemas.microsoft.com/office/drawing/2010/main">
+                <a:solidFill>
+                  <a:srgbClr val="FFFFFF"/>
+                </a:solidFill>
+              </a14:hiddenFill>
+            </a:ext>
+          </a:extLst>
+        </p:spPr>
+      </p:pic>
+      <p:cxnSp>
+        <p:nvCxnSpPr>
+          <p:cNvPr id="5" name="Straight Arrow Connector 4">
+            <a:extLst>
+              <a:ext uri="{FF2B5EF4-FFF2-40B4-BE49-F238E27FC236}">
+                <a16:creationId xmlns:a16="http://schemas.microsoft.com/office/drawing/2014/main" id="{C8B6DA09-F257-F3DB-FEA9-0D37DE665E72}"/>
+              </a:ext>
+            </a:extLst>
+          </p:cNvPr>
+          <p:cNvCxnSpPr/>
+          <p:nvPr/>
+        </p:nvCxnSpPr>
+        <p:spPr>
+          <a:xfrm flipH="1">
+            <a:off x="1743450" y="1659988"/>
+            <a:ext cx="2635036" cy="1751427"/>
+          </a:xfrm>
+          <a:prstGeom prst="straightConnector1">
+            <a:avLst/>
+          </a:prstGeom>
+          <a:ln>
+            <a:tailEnd type="triangle"/>
+          </a:ln>
+        </p:spPr>
+        <p:style>
+          <a:lnRef idx="1">
+            <a:schemeClr val="accent1"/>
+          </a:lnRef>
+          <a:fillRef idx="0">
+            <a:schemeClr val="accent1"/>
+          </a:fillRef>
+          <a:effectRef idx="0">
+            <a:schemeClr val="accent1"/>
+          </a:effectRef>
+          <a:fontRef idx="minor">
+            <a:schemeClr val="tx1"/>
+          </a:fontRef>
+        </p:style>
+      </p:cxnSp>
+      <p:cxnSp>
+        <p:nvCxnSpPr>
+          <p:cNvPr id="7" name="Straight Arrow Connector 6">
+            <a:extLst>
+              <a:ext uri="{FF2B5EF4-FFF2-40B4-BE49-F238E27FC236}">
+                <a16:creationId xmlns:a16="http://schemas.microsoft.com/office/drawing/2014/main" id="{C749DB79-0D2C-FE25-118C-B28472ECE691}"/>
+              </a:ext>
+            </a:extLst>
+          </p:cNvPr>
+          <p:cNvCxnSpPr/>
+          <p:nvPr/>
+        </p:nvCxnSpPr>
+        <p:spPr>
+          <a:xfrm flipH="1">
+            <a:off x="2229729" y="1742961"/>
+            <a:ext cx="2716127" cy="1682522"/>
+          </a:xfrm>
+          <a:prstGeom prst="straightConnector1">
+            <a:avLst/>
+          </a:prstGeom>
+          <a:ln>
+            <a:tailEnd type="triangle"/>
+          </a:ln>
+        </p:spPr>
+        <p:style>
+          <a:lnRef idx="1">
+            <a:schemeClr val="accent1"/>
+          </a:lnRef>
+          <a:fillRef idx="0">
+            <a:schemeClr val="accent1"/>
+          </a:fillRef>
+          <a:effectRef idx="0">
+            <a:schemeClr val="accent1"/>
+          </a:effectRef>
+          <a:fontRef idx="minor">
+            <a:schemeClr val="tx1"/>
+          </a:fontRef>
+        </p:style>
+      </p:cxnSp>
+      <p:cxnSp>
+        <p:nvCxnSpPr>
+          <p:cNvPr id="9" name="Straight Arrow Connector 8">
+            <a:extLst>
+              <a:ext uri="{FF2B5EF4-FFF2-40B4-BE49-F238E27FC236}">
+                <a16:creationId xmlns:a16="http://schemas.microsoft.com/office/drawing/2014/main" id="{54BB96B0-23D8-86F7-26C0-BE71E5C2702B}"/>
+              </a:ext>
+            </a:extLst>
+          </p:cNvPr>
+          <p:cNvCxnSpPr/>
+          <p:nvPr/>
+        </p:nvCxnSpPr>
+        <p:spPr>
+          <a:xfrm flipH="1">
+            <a:off x="2674214" y="1723292"/>
+            <a:ext cx="2828550" cy="1696498"/>
+          </a:xfrm>
+          <a:prstGeom prst="straightConnector1">
+            <a:avLst/>
+          </a:prstGeom>
+          <a:ln>
+            <a:tailEnd type="triangle"/>
+          </a:ln>
+        </p:spPr>
+        <p:style>
+          <a:lnRef idx="1">
+            <a:schemeClr val="accent1"/>
+          </a:lnRef>
+          <a:fillRef idx="0">
+            <a:schemeClr val="accent1"/>
+          </a:fillRef>
+          <a:effectRef idx="0">
+            <a:schemeClr val="accent1"/>
+          </a:effectRef>
+          <a:fontRef idx="minor">
+            <a:schemeClr val="tx1"/>
+          </a:fontRef>
+        </p:style>
+      </p:cxnSp>
     </p:spTree>
   </p:cSld>
   <p:clrMapOvr>

</xml_diff>